<commit_message>
Upto Stock List 2,2.1
</commit_message>
<xml_diff>
--- a/EVEREST PHONES.pptx
+++ b/EVEREST PHONES.pptx
@@ -15,6 +15,10 @@
     <p:sldId id="263" r:id="rId9"/>
     <p:sldId id="266" r:id="rId10"/>
     <p:sldId id="265" r:id="rId11"/>
+    <p:sldId id="267" r:id="rId12"/>
+    <p:sldId id="268" r:id="rId13"/>
+    <p:sldId id="269" r:id="rId14"/>
+    <p:sldId id="270" r:id="rId15"/>
   </p:sldIdLst>
   <p:sldSz cx="12192000" cy="6858000"/>
   <p:notesSz cx="6858000" cy="9144000"/>
@@ -128,6 +132,10 @@
             <p14:sldId id="263"/>
             <p14:sldId id="266"/>
             <p14:sldId id="265"/>
+            <p14:sldId id="267"/>
+            <p14:sldId id="268"/>
+            <p14:sldId id="269"/>
+            <p14:sldId id="270"/>
           </p14:sldIdLst>
         </p14:section>
       </p14:sectionLst>
@@ -270,7 +278,7 @@
           <a:p>
             <a:fld id="{7312517A-3F6F-449B-80CF-BC9EF307FF21}" type="datetimeFigureOut">
               <a:rPr lang="en-US" smtClean="0"/>
-              <a:t>9/4/2024</a:t>
+              <a:t>9/8/2024</a:t>
             </a:fld>
             <a:endParaRPr lang="en-US"/>
           </a:p>
@@ -440,7 +448,7 @@
           <a:p>
             <a:fld id="{7312517A-3F6F-449B-80CF-BC9EF307FF21}" type="datetimeFigureOut">
               <a:rPr lang="en-US" smtClean="0"/>
-              <a:t>9/4/2024</a:t>
+              <a:t>9/8/2024</a:t>
             </a:fld>
             <a:endParaRPr lang="en-US"/>
           </a:p>
@@ -620,7 +628,7 @@
           <a:p>
             <a:fld id="{7312517A-3F6F-449B-80CF-BC9EF307FF21}" type="datetimeFigureOut">
               <a:rPr lang="en-US" smtClean="0"/>
-              <a:t>9/4/2024</a:t>
+              <a:t>9/8/2024</a:t>
             </a:fld>
             <a:endParaRPr lang="en-US"/>
           </a:p>
@@ -790,7 +798,7 @@
           <a:p>
             <a:fld id="{7312517A-3F6F-449B-80CF-BC9EF307FF21}" type="datetimeFigureOut">
               <a:rPr lang="en-US" smtClean="0"/>
-              <a:t>9/4/2024</a:t>
+              <a:t>9/8/2024</a:t>
             </a:fld>
             <a:endParaRPr lang="en-US"/>
           </a:p>
@@ -1036,7 +1044,7 @@
           <a:p>
             <a:fld id="{7312517A-3F6F-449B-80CF-BC9EF307FF21}" type="datetimeFigureOut">
               <a:rPr lang="en-US" smtClean="0"/>
-              <a:t>9/4/2024</a:t>
+              <a:t>9/8/2024</a:t>
             </a:fld>
             <a:endParaRPr lang="en-US"/>
           </a:p>
@@ -1268,7 +1276,7 @@
           <a:p>
             <a:fld id="{7312517A-3F6F-449B-80CF-BC9EF307FF21}" type="datetimeFigureOut">
               <a:rPr lang="en-US" smtClean="0"/>
-              <a:t>9/4/2024</a:t>
+              <a:t>9/8/2024</a:t>
             </a:fld>
             <a:endParaRPr lang="en-US"/>
           </a:p>
@@ -1635,7 +1643,7 @@
           <a:p>
             <a:fld id="{7312517A-3F6F-449B-80CF-BC9EF307FF21}" type="datetimeFigureOut">
               <a:rPr lang="en-US" smtClean="0"/>
-              <a:t>9/4/2024</a:t>
+              <a:t>9/8/2024</a:t>
             </a:fld>
             <a:endParaRPr lang="en-US"/>
           </a:p>
@@ -1753,7 +1761,7 @@
           <a:p>
             <a:fld id="{7312517A-3F6F-449B-80CF-BC9EF307FF21}" type="datetimeFigureOut">
               <a:rPr lang="en-US" smtClean="0"/>
-              <a:t>9/4/2024</a:t>
+              <a:t>9/8/2024</a:t>
             </a:fld>
             <a:endParaRPr lang="en-US"/>
           </a:p>
@@ -1848,7 +1856,7 @@
           <a:p>
             <a:fld id="{7312517A-3F6F-449B-80CF-BC9EF307FF21}" type="datetimeFigureOut">
               <a:rPr lang="en-US" smtClean="0"/>
-              <a:t>9/4/2024</a:t>
+              <a:t>9/8/2024</a:t>
             </a:fld>
             <a:endParaRPr lang="en-US"/>
           </a:p>
@@ -2125,7 +2133,7 @@
           <a:p>
             <a:fld id="{7312517A-3F6F-449B-80CF-BC9EF307FF21}" type="datetimeFigureOut">
               <a:rPr lang="en-US" smtClean="0"/>
-              <a:t>9/4/2024</a:t>
+              <a:t>9/8/2024</a:t>
             </a:fld>
             <a:endParaRPr lang="en-US"/>
           </a:p>
@@ -2378,7 +2386,7 @@
           <a:p>
             <a:fld id="{7312517A-3F6F-449B-80CF-BC9EF307FF21}" type="datetimeFigureOut">
               <a:rPr lang="en-US" smtClean="0"/>
-              <a:t>9/4/2024</a:t>
+              <a:t>9/8/2024</a:t>
             </a:fld>
             <a:endParaRPr lang="en-US"/>
           </a:p>
@@ -2591,7 +2599,7 @@
           <a:p>
             <a:fld id="{7312517A-3F6F-449B-80CF-BC9EF307FF21}" type="datetimeFigureOut">
               <a:rPr lang="en-US" smtClean="0"/>
-              <a:t>9/4/2024</a:t>
+              <a:t>9/8/2024</a:t>
             </a:fld>
             <a:endParaRPr lang="en-US"/>
           </a:p>
@@ -3366,6 +3374,879 @@
 </p:sld>
 </file>
 
+<file path=ppt/slides/slide11.xml><?xml version="1.0" encoding="utf-8"?>
+<p:sld xmlns:a="http://schemas.openxmlformats.org/drawingml/2006/main" xmlns:r="http://schemas.openxmlformats.org/officeDocument/2006/relationships" xmlns:p="http://schemas.openxmlformats.org/presentationml/2006/main">
+  <p:cSld>
+    <p:spTree>
+      <p:nvGrpSpPr>
+        <p:cNvPr id="1" name=""/>
+        <p:cNvGrpSpPr/>
+        <p:nvPr/>
+      </p:nvGrpSpPr>
+      <p:grpSpPr>
+        <a:xfrm>
+          <a:off x="0" y="0"/>
+          <a:ext cx="0" cy="0"/>
+          <a:chOff x="0" y="0"/>
+          <a:chExt cx="0" cy="0"/>
+        </a:xfrm>
+      </p:grpSpPr>
+      <p:sp>
+        <p:nvSpPr>
+          <p:cNvPr id="2" name="Title 1"/>
+          <p:cNvSpPr>
+            <a:spLocks noGrp="1"/>
+          </p:cNvSpPr>
+          <p:nvPr>
+            <p:ph type="ctrTitle"/>
+          </p:nvPr>
+        </p:nvSpPr>
+        <p:spPr>
+          <a:xfrm>
+            <a:off x="1066799" y="491414"/>
+            <a:ext cx="9144000" cy="971626"/>
+          </a:xfrm>
+        </p:spPr>
+        <p:txBody>
+          <a:bodyPr>
+            <a:normAutofit/>
+          </a:bodyPr>
+          <a:lstStyle/>
+          <a:p>
+            <a:pPr algn="l"/>
+            <a:r>
+              <a:rPr lang="en-US" sz="4000" b="1" dirty="0" smtClean="0"/>
+              <a:t>2. </a:t>
+            </a:r>
+            <a:r>
+              <a:rPr lang="en-US" sz="4000" b="1" dirty="0"/>
+              <a:t>Account Access and Core Functions</a:t>
+            </a:r>
+            <a:endParaRPr lang="en-US" sz="4000" b="1" dirty="0"/>
+          </a:p>
+        </p:txBody>
+      </p:sp>
+      <p:sp>
+        <p:nvSpPr>
+          <p:cNvPr id="3" name="Subtitle 2"/>
+          <p:cNvSpPr>
+            <a:spLocks noGrp="1"/>
+          </p:cNvSpPr>
+          <p:nvPr>
+            <p:ph type="subTitle" idx="1"/>
+          </p:nvPr>
+        </p:nvSpPr>
+        <p:spPr>
+          <a:xfrm>
+            <a:off x="143690" y="1463039"/>
+            <a:ext cx="11941627" cy="5251269"/>
+          </a:xfrm>
+        </p:spPr>
+        <p:txBody>
+          <a:bodyPr>
+            <a:noAutofit/>
+          </a:bodyPr>
+          <a:lstStyle/>
+          <a:p>
+            <a:r>
+              <a:rPr lang="en-US" sz="1600" dirty="0"/>
+              <a:t>Unlock a World of Amazing </a:t>
+            </a:r>
+            <a:r>
+              <a:rPr lang="en-US" sz="1600" dirty="0" smtClean="0"/>
+              <a:t>Phones </a:t>
+            </a:r>
+            <a:r>
+              <a:rPr lang="en-US" sz="1600" dirty="0"/>
+              <a:t>at Your </a:t>
+            </a:r>
+            <a:r>
+              <a:rPr lang="en-US" sz="1600" dirty="0" smtClean="0"/>
+              <a:t>Fingertips</a:t>
+            </a:r>
+          </a:p>
+          <a:p>
+            <a:pPr algn="just"/>
+            <a:r>
+              <a:rPr lang="en-US" sz="1600" b="1" dirty="0" smtClean="0">
+                <a:solidFill>
+                  <a:srgbClr val="FF0000"/>
+                </a:solidFill>
+              </a:rPr>
+              <a:t>Step </a:t>
+            </a:r>
+            <a:r>
+              <a:rPr lang="en-US" sz="1600" b="1" dirty="0">
+                <a:solidFill>
+                  <a:srgbClr val="FF0000"/>
+                </a:solidFill>
+              </a:rPr>
+              <a:t>1</a:t>
+            </a:r>
+            <a:r>
+              <a:rPr lang="en-US" sz="1600" dirty="0"/>
+              <a:t>: Visit our secure login page at </a:t>
+            </a:r>
+            <a:r>
+              <a:rPr lang="en-US" sz="1600" dirty="0">
+                <a:hlinkClick r:id="rId2"/>
+              </a:rPr>
+              <a:t>https://everestphones.com/login</a:t>
+            </a:r>
+            <a:endParaRPr lang="en-US" sz="1600" dirty="0"/>
+          </a:p>
+          <a:p>
+            <a:pPr algn="just"/>
+            <a:r>
+              <a:rPr lang="en-US" sz="1600" b="1" dirty="0" smtClean="0">
+                <a:solidFill>
+                  <a:srgbClr val="FF0000"/>
+                </a:solidFill>
+              </a:rPr>
+              <a:t>Step 2</a:t>
+            </a:r>
+            <a:r>
+              <a:rPr lang="en-US" sz="1600" dirty="0" smtClean="0"/>
+              <a:t>: </a:t>
+            </a:r>
+            <a:r>
+              <a:rPr lang="en-US" sz="1600" dirty="0"/>
+              <a:t>Enter your registered email address and password</a:t>
+            </a:r>
+          </a:p>
+          <a:p>
+            <a:pPr algn="just"/>
+            <a:r>
+              <a:rPr lang="en-US" sz="1600" b="1" dirty="0">
+                <a:solidFill>
+                  <a:srgbClr val="FF0000"/>
+                </a:solidFill>
+              </a:rPr>
+              <a:t>Step 3</a:t>
+            </a:r>
+            <a:r>
+              <a:rPr lang="en-US" sz="1600" dirty="0"/>
+              <a:t>: Click 'Sign In' to access your account and start exploring!</a:t>
+            </a:r>
+          </a:p>
+          <a:p>
+            <a:pPr algn="l"/>
+            <a:endParaRPr lang="en-US" sz="1600" dirty="0" smtClean="0"/>
+          </a:p>
+          <a:p>
+            <a:pPr algn="l"/>
+            <a:endParaRPr lang="en-US" sz="1600" dirty="0"/>
+          </a:p>
+        </p:txBody>
+      </p:sp>
+      <p:pic>
+        <p:nvPicPr>
+          <p:cNvPr id="4" name="Picture 3"/>
+          <p:cNvPicPr>
+            <a:picLocks noChangeAspect="1"/>
+          </p:cNvPicPr>
+          <p:nvPr/>
+        </p:nvPicPr>
+        <p:blipFill>
+          <a:blip r:embed="rId3" cstate="print">
+            <a:extLst>
+              <a:ext uri="{28A0092B-C50C-407E-A947-70E740481C1C}">
+                <a14:useLocalDpi xmlns:a14="http://schemas.microsoft.com/office/drawing/2010/main" val="0"/>
+              </a:ext>
+            </a:extLst>
+          </a:blip>
+          <a:stretch>
+            <a:fillRect/>
+          </a:stretch>
+        </p:blipFill>
+        <p:spPr>
+          <a:xfrm>
+            <a:off x="8858793" y="50696"/>
+            <a:ext cx="3226525" cy="573210"/>
+          </a:xfrm>
+          <a:prstGeom prst="rect">
+            <a:avLst/>
+          </a:prstGeom>
+        </p:spPr>
+      </p:pic>
+      <p:cxnSp>
+        <p:nvCxnSpPr>
+          <p:cNvPr id="8" name="Straight Connector 7"/>
+          <p:cNvCxnSpPr/>
+          <p:nvPr/>
+        </p:nvCxnSpPr>
+        <p:spPr>
+          <a:xfrm>
+            <a:off x="0" y="862149"/>
+            <a:ext cx="12192000" cy="0"/>
+          </a:xfrm>
+          <a:prstGeom prst="line">
+            <a:avLst/>
+          </a:prstGeom>
+        </p:spPr>
+        <p:style>
+          <a:lnRef idx="3">
+            <a:schemeClr val="dk1"/>
+          </a:lnRef>
+          <a:fillRef idx="0">
+            <a:schemeClr val="dk1"/>
+          </a:fillRef>
+          <a:effectRef idx="2">
+            <a:schemeClr val="dk1"/>
+          </a:effectRef>
+          <a:fontRef idx="minor">
+            <a:schemeClr val="tx1"/>
+          </a:fontRef>
+        </p:style>
+      </p:cxnSp>
+      <p:pic>
+        <p:nvPicPr>
+          <p:cNvPr id="7" name="Picture 6"/>
+          <p:cNvPicPr>
+            <a:picLocks noChangeAspect="1"/>
+          </p:cNvPicPr>
+          <p:nvPr/>
+        </p:nvPicPr>
+        <p:blipFill>
+          <a:blip r:embed="rId4"/>
+          <a:stretch>
+            <a:fillRect/>
+          </a:stretch>
+        </p:blipFill>
+        <p:spPr>
+          <a:xfrm>
+            <a:off x="1600200" y="3040380"/>
+            <a:ext cx="6492240" cy="3673928"/>
+          </a:xfrm>
+          <a:prstGeom prst="rect">
+            <a:avLst/>
+          </a:prstGeom>
+        </p:spPr>
+      </p:pic>
+    </p:spTree>
+    <p:extLst>
+      <p:ext uri="{BB962C8B-B14F-4D97-AF65-F5344CB8AC3E}">
+        <p14:creationId xmlns:p14="http://schemas.microsoft.com/office/powerpoint/2010/main" val="1539629874"/>
+      </p:ext>
+    </p:extLst>
+  </p:cSld>
+  <p:clrMapOvr>
+    <a:masterClrMapping/>
+  </p:clrMapOvr>
+  <p:timing>
+    <p:tnLst>
+      <p:par>
+        <p:cTn id="1" dur="indefinite" restart="never" nodeType="tmRoot"/>
+      </p:par>
+    </p:tnLst>
+  </p:timing>
+</p:sld>
+</file>
+
+<file path=ppt/slides/slide12.xml><?xml version="1.0" encoding="utf-8"?>
+<p:sld xmlns:a="http://schemas.openxmlformats.org/drawingml/2006/main" xmlns:r="http://schemas.openxmlformats.org/officeDocument/2006/relationships" xmlns:p="http://schemas.openxmlformats.org/presentationml/2006/main">
+  <p:cSld>
+    <p:spTree>
+      <p:nvGrpSpPr>
+        <p:cNvPr id="1" name=""/>
+        <p:cNvGrpSpPr/>
+        <p:nvPr/>
+      </p:nvGrpSpPr>
+      <p:grpSpPr>
+        <a:xfrm>
+          <a:off x="0" y="0"/>
+          <a:ext cx="0" cy="0"/>
+          <a:chOff x="0" y="0"/>
+          <a:chExt cx="0" cy="0"/>
+        </a:xfrm>
+      </p:grpSpPr>
+      <p:sp>
+        <p:nvSpPr>
+          <p:cNvPr id="2" name="Title 1"/>
+          <p:cNvSpPr>
+            <a:spLocks noGrp="1"/>
+          </p:cNvSpPr>
+          <p:nvPr>
+            <p:ph type="ctrTitle"/>
+          </p:nvPr>
+        </p:nvSpPr>
+        <p:spPr>
+          <a:xfrm>
+            <a:off x="1066799" y="491414"/>
+            <a:ext cx="9144000" cy="971626"/>
+          </a:xfrm>
+        </p:spPr>
+        <p:txBody>
+          <a:bodyPr>
+            <a:normAutofit/>
+          </a:bodyPr>
+          <a:lstStyle/>
+          <a:p>
+            <a:pPr algn="l"/>
+            <a:r>
+              <a:rPr lang="en-US" sz="4000" b="1" dirty="0" smtClean="0"/>
+              <a:t>2.1 Stock List</a:t>
+            </a:r>
+            <a:endParaRPr lang="en-US" sz="4000" b="1" dirty="0"/>
+          </a:p>
+        </p:txBody>
+      </p:sp>
+      <p:sp>
+        <p:nvSpPr>
+          <p:cNvPr id="3" name="Subtitle 2"/>
+          <p:cNvSpPr>
+            <a:spLocks noGrp="1"/>
+          </p:cNvSpPr>
+          <p:nvPr>
+            <p:ph type="subTitle" idx="1"/>
+          </p:nvPr>
+        </p:nvSpPr>
+        <p:spPr>
+          <a:xfrm>
+            <a:off x="143690" y="1463039"/>
+            <a:ext cx="11941627" cy="5251269"/>
+          </a:xfrm>
+        </p:spPr>
+        <p:txBody>
+          <a:bodyPr>
+            <a:noAutofit/>
+          </a:bodyPr>
+          <a:lstStyle/>
+          <a:p>
+            <a:pPr algn="just"/>
+            <a:r>
+              <a:rPr lang="en-US" sz="1600" dirty="0" smtClean="0"/>
+              <a:t>After </a:t>
+            </a:r>
+            <a:r>
+              <a:rPr lang="en-US" sz="1600" dirty="0"/>
+              <a:t>a successful login, you'll embark on your phone-hunting journey:</a:t>
+            </a:r>
+          </a:p>
+          <a:p>
+            <a:pPr algn="just"/>
+            <a:r>
+              <a:rPr lang="en-US" sz="1600" b="1" dirty="0">
+                <a:solidFill>
+                  <a:srgbClr val="FF0000"/>
+                </a:solidFill>
+              </a:rPr>
+              <a:t>Instant Access</a:t>
+            </a:r>
+            <a:r>
+              <a:rPr lang="en-US" sz="1600" dirty="0"/>
+              <a:t>: You'll be whisked away to our virtual showroom at </a:t>
+            </a:r>
+            <a:r>
+              <a:rPr lang="en-US" sz="1600" dirty="0">
+                <a:hlinkClick r:id="rId2"/>
+              </a:rPr>
+              <a:t>https://everestphones.com/stock-list</a:t>
+            </a:r>
+            <a:endParaRPr lang="en-US" sz="1600" dirty="0"/>
+          </a:p>
+          <a:p>
+            <a:pPr algn="just"/>
+            <a:r>
+              <a:rPr lang="en-US" sz="1600" b="1" dirty="0">
+                <a:solidFill>
+                  <a:srgbClr val="FF0000"/>
+                </a:solidFill>
+              </a:rPr>
+              <a:t>Your Personal Catalog</a:t>
+            </a:r>
+            <a:r>
+              <a:rPr lang="en-US" sz="1600" dirty="0"/>
+              <a:t>: Behold a curated list of our latest and greatest phones, each with: </a:t>
+            </a:r>
+            <a:endParaRPr lang="en-US" sz="1600" dirty="0" smtClean="0"/>
+          </a:p>
+          <a:p>
+            <a:pPr algn="just"/>
+            <a:r>
+              <a:rPr lang="en-US" sz="1600" dirty="0" smtClean="0"/>
+              <a:t>• </a:t>
+            </a:r>
+            <a:r>
+              <a:rPr lang="en-US" sz="1600" dirty="0"/>
+              <a:t>Real-time availability </a:t>
+            </a:r>
+            <a:r>
+              <a:rPr lang="en-US" sz="1600" dirty="0" smtClean="0"/>
+              <a:t> • </a:t>
+            </a:r>
+            <a:r>
+              <a:rPr lang="en-US" sz="1600" dirty="0"/>
+              <a:t>Competitive pricing </a:t>
+            </a:r>
+            <a:r>
+              <a:rPr lang="en-US" sz="1600" dirty="0" smtClean="0"/>
+              <a:t> • </a:t>
+            </a:r>
+            <a:r>
+              <a:rPr lang="en-US" sz="1600" dirty="0"/>
+              <a:t>Quality grade scale</a:t>
+            </a:r>
+          </a:p>
+          <a:p>
+            <a:pPr algn="just"/>
+            <a:r>
+              <a:rPr lang="en-US" sz="1600" b="1" dirty="0">
+                <a:solidFill>
+                  <a:srgbClr val="FF0000"/>
+                </a:solidFill>
+              </a:rPr>
+              <a:t>Dive Deeper</a:t>
+            </a:r>
+            <a:r>
+              <a:rPr lang="en-US" sz="1600" dirty="0"/>
+              <a:t>: Curious about a specific model? Simply click on any product to uncover: </a:t>
+            </a:r>
+            <a:endParaRPr lang="en-US" sz="1600" dirty="0" smtClean="0"/>
+          </a:p>
+          <a:p>
+            <a:pPr algn="just"/>
+            <a:r>
+              <a:rPr lang="en-US" sz="1600" dirty="0" smtClean="0"/>
+              <a:t>• </a:t>
+            </a:r>
+            <a:r>
+              <a:rPr lang="en-US" sz="1600" dirty="0"/>
+              <a:t>Detailed </a:t>
+            </a:r>
+            <a:r>
+              <a:rPr lang="en-US" sz="1600" dirty="0" smtClean="0"/>
+              <a:t>information • </a:t>
+            </a:r>
+            <a:r>
+              <a:rPr lang="en-US" sz="1600" dirty="0"/>
+              <a:t>Current warehouse location</a:t>
+            </a:r>
+          </a:p>
+          <a:p>
+            <a:pPr algn="l"/>
+            <a:endParaRPr lang="en-US" sz="1600" dirty="0"/>
+          </a:p>
+        </p:txBody>
+      </p:sp>
+      <p:pic>
+        <p:nvPicPr>
+          <p:cNvPr id="4" name="Picture 3"/>
+          <p:cNvPicPr>
+            <a:picLocks noChangeAspect="1"/>
+          </p:cNvPicPr>
+          <p:nvPr/>
+        </p:nvPicPr>
+        <p:blipFill>
+          <a:blip r:embed="rId3" cstate="print">
+            <a:extLst>
+              <a:ext uri="{28A0092B-C50C-407E-A947-70E740481C1C}">
+                <a14:useLocalDpi xmlns:a14="http://schemas.microsoft.com/office/drawing/2010/main" val="0"/>
+              </a:ext>
+            </a:extLst>
+          </a:blip>
+          <a:stretch>
+            <a:fillRect/>
+          </a:stretch>
+        </p:blipFill>
+        <p:spPr>
+          <a:xfrm>
+            <a:off x="8858793" y="50696"/>
+            <a:ext cx="3226525" cy="573210"/>
+          </a:xfrm>
+          <a:prstGeom prst="rect">
+            <a:avLst/>
+          </a:prstGeom>
+        </p:spPr>
+      </p:pic>
+      <p:cxnSp>
+        <p:nvCxnSpPr>
+          <p:cNvPr id="8" name="Straight Connector 7"/>
+          <p:cNvCxnSpPr/>
+          <p:nvPr/>
+        </p:nvCxnSpPr>
+        <p:spPr>
+          <a:xfrm>
+            <a:off x="0" y="862149"/>
+            <a:ext cx="12192000" cy="0"/>
+          </a:xfrm>
+          <a:prstGeom prst="line">
+            <a:avLst/>
+          </a:prstGeom>
+        </p:spPr>
+        <p:style>
+          <a:lnRef idx="3">
+            <a:schemeClr val="dk1"/>
+          </a:lnRef>
+          <a:fillRef idx="0">
+            <a:schemeClr val="dk1"/>
+          </a:fillRef>
+          <a:effectRef idx="2">
+            <a:schemeClr val="dk1"/>
+          </a:effectRef>
+          <a:fontRef idx="minor">
+            <a:schemeClr val="tx1"/>
+          </a:fontRef>
+        </p:style>
+      </p:cxnSp>
+      <p:pic>
+        <p:nvPicPr>
+          <p:cNvPr id="5" name="Picture 4"/>
+          <p:cNvPicPr>
+            <a:picLocks noChangeAspect="1"/>
+          </p:cNvPicPr>
+          <p:nvPr/>
+        </p:nvPicPr>
+        <p:blipFill>
+          <a:blip r:embed="rId4"/>
+          <a:stretch>
+            <a:fillRect/>
+          </a:stretch>
+        </p:blipFill>
+        <p:spPr>
+          <a:xfrm>
+            <a:off x="143690" y="3526972"/>
+            <a:ext cx="11312434" cy="3069771"/>
+          </a:xfrm>
+          <a:prstGeom prst="rect">
+            <a:avLst/>
+          </a:prstGeom>
+        </p:spPr>
+      </p:pic>
+    </p:spTree>
+    <p:extLst>
+      <p:ext uri="{BB962C8B-B14F-4D97-AF65-F5344CB8AC3E}">
+        <p14:creationId xmlns:p14="http://schemas.microsoft.com/office/powerpoint/2010/main" val="2521142151"/>
+      </p:ext>
+    </p:extLst>
+  </p:cSld>
+  <p:clrMapOvr>
+    <a:masterClrMapping/>
+  </p:clrMapOvr>
+  <p:timing>
+    <p:tnLst>
+      <p:par>
+        <p:cTn id="1" dur="indefinite" restart="never" nodeType="tmRoot"/>
+      </p:par>
+    </p:tnLst>
+  </p:timing>
+</p:sld>
+</file>
+
+<file path=ppt/slides/slide13.xml><?xml version="1.0" encoding="utf-8"?>
+<p:sld xmlns:a="http://schemas.openxmlformats.org/drawingml/2006/main" xmlns:r="http://schemas.openxmlformats.org/officeDocument/2006/relationships" xmlns:p="http://schemas.openxmlformats.org/presentationml/2006/main">
+  <p:cSld>
+    <p:spTree>
+      <p:nvGrpSpPr>
+        <p:cNvPr id="1" name=""/>
+        <p:cNvGrpSpPr/>
+        <p:nvPr/>
+      </p:nvGrpSpPr>
+      <p:grpSpPr>
+        <a:xfrm>
+          <a:off x="0" y="0"/>
+          <a:ext cx="0" cy="0"/>
+          <a:chOff x="0" y="0"/>
+          <a:chExt cx="0" cy="0"/>
+        </a:xfrm>
+      </p:grpSpPr>
+      <p:sp>
+        <p:nvSpPr>
+          <p:cNvPr id="2" name="Title 1"/>
+          <p:cNvSpPr>
+            <a:spLocks noGrp="1"/>
+          </p:cNvSpPr>
+          <p:nvPr>
+            <p:ph type="ctrTitle"/>
+          </p:nvPr>
+        </p:nvSpPr>
+        <p:spPr>
+          <a:xfrm>
+            <a:off x="1066799" y="491414"/>
+            <a:ext cx="9144000" cy="971626"/>
+          </a:xfrm>
+        </p:spPr>
+        <p:txBody>
+          <a:bodyPr>
+            <a:normAutofit/>
+          </a:bodyPr>
+          <a:lstStyle/>
+          <a:p>
+            <a:pPr algn="l"/>
+            <a:r>
+              <a:rPr lang="en-US" sz="4000" b="1" dirty="0" smtClean="0"/>
+              <a:t>2.2 Shipping phones from Everest Phones</a:t>
+            </a:r>
+            <a:endParaRPr lang="en-US" sz="4000" b="1" dirty="0"/>
+          </a:p>
+        </p:txBody>
+      </p:sp>
+      <p:sp>
+        <p:nvSpPr>
+          <p:cNvPr id="3" name="Subtitle 2"/>
+          <p:cNvSpPr>
+            <a:spLocks noGrp="1"/>
+          </p:cNvSpPr>
+          <p:nvPr>
+            <p:ph type="subTitle" idx="1"/>
+          </p:nvPr>
+        </p:nvSpPr>
+        <p:spPr>
+          <a:xfrm>
+            <a:off x="143690" y="1463039"/>
+            <a:ext cx="11941627" cy="5251269"/>
+          </a:xfrm>
+        </p:spPr>
+        <p:txBody>
+          <a:bodyPr>
+            <a:noAutofit/>
+          </a:bodyPr>
+          <a:lstStyle/>
+          <a:p>
+            <a:pPr algn="l"/>
+            <a:endParaRPr lang="en-US" sz="1600" dirty="0"/>
+          </a:p>
+        </p:txBody>
+      </p:sp>
+      <p:pic>
+        <p:nvPicPr>
+          <p:cNvPr id="4" name="Picture 3"/>
+          <p:cNvPicPr>
+            <a:picLocks noChangeAspect="1"/>
+          </p:cNvPicPr>
+          <p:nvPr/>
+        </p:nvPicPr>
+        <p:blipFill>
+          <a:blip r:embed="rId2" cstate="print">
+            <a:extLst>
+              <a:ext uri="{28A0092B-C50C-407E-A947-70E740481C1C}">
+                <a14:useLocalDpi xmlns:a14="http://schemas.microsoft.com/office/drawing/2010/main" val="0"/>
+              </a:ext>
+            </a:extLst>
+          </a:blip>
+          <a:stretch>
+            <a:fillRect/>
+          </a:stretch>
+        </p:blipFill>
+        <p:spPr>
+          <a:xfrm>
+            <a:off x="8858793" y="50696"/>
+            <a:ext cx="3226525" cy="573210"/>
+          </a:xfrm>
+          <a:prstGeom prst="rect">
+            <a:avLst/>
+          </a:prstGeom>
+        </p:spPr>
+      </p:pic>
+      <p:cxnSp>
+        <p:nvCxnSpPr>
+          <p:cNvPr id="8" name="Straight Connector 7"/>
+          <p:cNvCxnSpPr/>
+          <p:nvPr/>
+        </p:nvCxnSpPr>
+        <p:spPr>
+          <a:xfrm>
+            <a:off x="0" y="862149"/>
+            <a:ext cx="12192000" cy="0"/>
+          </a:xfrm>
+          <a:prstGeom prst="line">
+            <a:avLst/>
+          </a:prstGeom>
+        </p:spPr>
+        <p:style>
+          <a:lnRef idx="3">
+            <a:schemeClr val="dk1"/>
+          </a:lnRef>
+          <a:fillRef idx="0">
+            <a:schemeClr val="dk1"/>
+          </a:fillRef>
+          <a:effectRef idx="2">
+            <a:schemeClr val="dk1"/>
+          </a:effectRef>
+          <a:fontRef idx="minor">
+            <a:schemeClr val="tx1"/>
+          </a:fontRef>
+        </p:style>
+      </p:cxnSp>
+    </p:spTree>
+    <p:extLst>
+      <p:ext uri="{BB962C8B-B14F-4D97-AF65-F5344CB8AC3E}">
+        <p14:creationId xmlns:p14="http://schemas.microsoft.com/office/powerpoint/2010/main" val="2291384725"/>
+      </p:ext>
+    </p:extLst>
+  </p:cSld>
+  <p:clrMapOvr>
+    <a:masterClrMapping/>
+  </p:clrMapOvr>
+  <p:timing>
+    <p:tnLst>
+      <p:par>
+        <p:cTn id="1" dur="indefinite" restart="never" nodeType="tmRoot"/>
+      </p:par>
+    </p:tnLst>
+  </p:timing>
+</p:sld>
+</file>
+
+<file path=ppt/slides/slide14.xml><?xml version="1.0" encoding="utf-8"?>
+<p:sld xmlns:a="http://schemas.openxmlformats.org/drawingml/2006/main" xmlns:r="http://schemas.openxmlformats.org/officeDocument/2006/relationships" xmlns:p="http://schemas.openxmlformats.org/presentationml/2006/main">
+  <p:cSld>
+    <p:spTree>
+      <p:nvGrpSpPr>
+        <p:cNvPr id="1" name=""/>
+        <p:cNvGrpSpPr/>
+        <p:nvPr/>
+      </p:nvGrpSpPr>
+      <p:grpSpPr>
+        <a:xfrm>
+          <a:off x="0" y="0"/>
+          <a:ext cx="0" cy="0"/>
+          <a:chOff x="0" y="0"/>
+          <a:chExt cx="0" cy="0"/>
+        </a:xfrm>
+      </p:grpSpPr>
+      <p:sp>
+        <p:nvSpPr>
+          <p:cNvPr id="2" name="Title 1"/>
+          <p:cNvSpPr>
+            <a:spLocks noGrp="1"/>
+          </p:cNvSpPr>
+          <p:nvPr>
+            <p:ph type="ctrTitle"/>
+          </p:nvPr>
+        </p:nvSpPr>
+        <p:spPr>
+          <a:xfrm>
+            <a:off x="1066799" y="491414"/>
+            <a:ext cx="9144000" cy="971626"/>
+          </a:xfrm>
+        </p:spPr>
+        <p:txBody>
+          <a:bodyPr>
+            <a:normAutofit/>
+          </a:bodyPr>
+          <a:lstStyle/>
+          <a:p>
+            <a:pPr algn="l"/>
+            <a:r>
+              <a:rPr lang="en-US" sz="4000" b="1" dirty="0" smtClean="0"/>
+              <a:t>2. </a:t>
+            </a:r>
+            <a:r>
+              <a:rPr lang="en-US" sz="4000" b="1" dirty="0"/>
+              <a:t>Account Access and Core Functions</a:t>
+            </a:r>
+            <a:endParaRPr lang="en-US" sz="4000" b="1" dirty="0"/>
+          </a:p>
+        </p:txBody>
+      </p:sp>
+      <p:sp>
+        <p:nvSpPr>
+          <p:cNvPr id="3" name="Subtitle 2"/>
+          <p:cNvSpPr>
+            <a:spLocks noGrp="1"/>
+          </p:cNvSpPr>
+          <p:nvPr>
+            <p:ph type="subTitle" idx="1"/>
+          </p:nvPr>
+        </p:nvSpPr>
+        <p:spPr>
+          <a:xfrm>
+            <a:off x="143690" y="1463039"/>
+            <a:ext cx="11941627" cy="5251269"/>
+          </a:xfrm>
+        </p:spPr>
+        <p:txBody>
+          <a:bodyPr>
+            <a:noAutofit/>
+          </a:bodyPr>
+          <a:lstStyle/>
+          <a:p>
+            <a:pPr algn="l"/>
+            <a:endParaRPr lang="en-US" sz="1600" dirty="0"/>
+          </a:p>
+        </p:txBody>
+      </p:sp>
+      <p:pic>
+        <p:nvPicPr>
+          <p:cNvPr id="4" name="Picture 3"/>
+          <p:cNvPicPr>
+            <a:picLocks noChangeAspect="1"/>
+          </p:cNvPicPr>
+          <p:nvPr/>
+        </p:nvPicPr>
+        <p:blipFill>
+          <a:blip r:embed="rId2" cstate="print">
+            <a:extLst>
+              <a:ext uri="{28A0092B-C50C-407E-A947-70E740481C1C}">
+                <a14:useLocalDpi xmlns:a14="http://schemas.microsoft.com/office/drawing/2010/main" val="0"/>
+              </a:ext>
+            </a:extLst>
+          </a:blip>
+          <a:stretch>
+            <a:fillRect/>
+          </a:stretch>
+        </p:blipFill>
+        <p:spPr>
+          <a:xfrm>
+            <a:off x="8858793" y="50696"/>
+            <a:ext cx="3226525" cy="573210"/>
+          </a:xfrm>
+          <a:prstGeom prst="rect">
+            <a:avLst/>
+          </a:prstGeom>
+        </p:spPr>
+      </p:pic>
+      <p:cxnSp>
+        <p:nvCxnSpPr>
+          <p:cNvPr id="8" name="Straight Connector 7"/>
+          <p:cNvCxnSpPr/>
+          <p:nvPr/>
+        </p:nvCxnSpPr>
+        <p:spPr>
+          <a:xfrm>
+            <a:off x="0" y="862149"/>
+            <a:ext cx="12192000" cy="0"/>
+          </a:xfrm>
+          <a:prstGeom prst="line">
+            <a:avLst/>
+          </a:prstGeom>
+        </p:spPr>
+        <p:style>
+          <a:lnRef idx="3">
+            <a:schemeClr val="dk1"/>
+          </a:lnRef>
+          <a:fillRef idx="0">
+            <a:schemeClr val="dk1"/>
+          </a:fillRef>
+          <a:effectRef idx="2">
+            <a:schemeClr val="dk1"/>
+          </a:effectRef>
+          <a:fontRef idx="minor">
+            <a:schemeClr val="tx1"/>
+          </a:fontRef>
+        </p:style>
+      </p:cxnSp>
+    </p:spTree>
+    <p:extLst>
+      <p:ext uri="{BB962C8B-B14F-4D97-AF65-F5344CB8AC3E}">
+        <p14:creationId xmlns:p14="http://schemas.microsoft.com/office/powerpoint/2010/main" val="2024631523"/>
+      </p:ext>
+    </p:extLst>
+  </p:cSld>
+  <p:clrMapOvr>
+    <a:masterClrMapping/>
+  </p:clrMapOvr>
+  <p:timing>
+    <p:tnLst>
+      <p:par>
+        <p:cTn id="1" dur="indefinite" restart="never" nodeType="tmRoot"/>
+      </p:par>
+    </p:tnLst>
+  </p:timing>
+</p:sld>
+</file>
+
 <file path=ppt/slides/slide2.xml><?xml version="1.0" encoding="utf-8"?>
 <p:sld xmlns:a="http://schemas.openxmlformats.org/drawingml/2006/main" xmlns:r="http://schemas.openxmlformats.org/officeDocument/2006/relationships" xmlns:p="http://schemas.openxmlformats.org/presentationml/2006/main">
   <p:cSld>
@@ -3676,8 +4557,8 @@
   <p:clrMapOvr>
     <a:masterClrMapping/>
   </p:clrMapOvr>
-  <mc:AlternateContent xmlns:mc="http://schemas.openxmlformats.org/markup-compatibility/2006">
-    <mc:Choice xmlns:p14="http://schemas.microsoft.com/office/powerpoint/2010/main" Requires="p14">
+  <mc:AlternateContent xmlns:mc="http://schemas.openxmlformats.org/markup-compatibility/2006" xmlns:p14="http://schemas.microsoft.com/office/powerpoint/2010/main">
+    <mc:Choice Requires="p14">
       <p:transition spd="slow" p14:dur="2000">
         <p:sndAc>
           <p:stSnd>
@@ -3686,11 +4567,11 @@
         </p:sndAc>
       </p:transition>
     </mc:Choice>
-    <mc:Fallback>
+    <mc:Fallback xmlns="">
       <p:transition spd="slow">
         <p:sndAc>
           <p:stSnd>
-            <p:snd r:embed="rId2" name="applause.wav"/>
+            <p:snd r:embed="rId6" name="applause.wav"/>
           </p:stSnd>
         </p:sndAc>
       </p:transition>
@@ -3802,19 +4683,11 @@
             </a:r>
             <a:r>
               <a:rPr lang="en-US" sz="2000" b="1" dirty="0" smtClean="0"/>
-              <a:t>        </a:t>
-            </a:r>
-            <a:r>
-              <a:rPr lang="en-US" sz="2000" b="1" dirty="0" smtClean="0"/>
-              <a:t>      </a:t>
+              <a:t>              </a:t>
             </a:r>
             <a:r>
               <a:rPr lang="en-US" sz="2000" dirty="0" smtClean="0"/>
-              <a:t>:</a:t>
-            </a:r>
-            <a:r>
-              <a:rPr lang="en-US" sz="2000" dirty="0" smtClean="0"/>
-              <a:t>Enter </a:t>
+              <a:t>:Enter </a:t>
             </a:r>
             <a:r>
               <a:rPr lang="en-US" sz="2000" dirty="0"/>
@@ -3840,19 +4713,11 @@
             </a:r>
             <a:r>
               <a:rPr lang="en-US" sz="2000" b="1" dirty="0" smtClean="0"/>
-              <a:t>         </a:t>
-            </a:r>
-            <a:r>
-              <a:rPr lang="en-US" sz="2000" b="1" dirty="0" smtClean="0"/>
-              <a:t>      </a:t>
+              <a:t>               </a:t>
             </a:r>
             <a:r>
               <a:rPr lang="en-US" sz="2000" dirty="0" smtClean="0"/>
-              <a:t>:</a:t>
-            </a:r>
-            <a:r>
-              <a:rPr lang="en-US" sz="2000" dirty="0" smtClean="0"/>
-              <a:t>Enter </a:t>
+              <a:t>:Enter </a:t>
             </a:r>
             <a:r>
               <a:rPr lang="en-US" sz="2000" dirty="0"/>
@@ -3878,19 +4743,11 @@
             </a:r>
             <a:r>
               <a:rPr lang="en-US" sz="2000" b="1" dirty="0" smtClean="0"/>
-              <a:t> </a:t>
-            </a:r>
-            <a:r>
-              <a:rPr lang="en-US" sz="2000" b="1" dirty="0" smtClean="0"/>
-              <a:t>     </a:t>
+              <a:t>      </a:t>
             </a:r>
             <a:r>
               <a:rPr lang="en-US" sz="2000" dirty="0" smtClean="0"/>
-              <a:t>:</a:t>
-            </a:r>
-            <a:r>
-              <a:rPr lang="en-US" sz="2000" dirty="0" smtClean="0"/>
-              <a:t>Enter </a:t>
+              <a:t>:Enter </a:t>
             </a:r>
             <a:r>
               <a:rPr lang="en-US" sz="2000" dirty="0"/>
@@ -3908,19 +4765,11 @@
             </a:r>
             <a:r>
               <a:rPr lang="en-US" sz="2000" b="1" dirty="0" smtClean="0"/>
-              <a:t>                   </a:t>
-            </a:r>
-            <a:r>
-              <a:rPr lang="en-US" sz="2000" b="1" dirty="0" smtClean="0"/>
-              <a:t>     </a:t>
+              <a:t>                        </a:t>
             </a:r>
             <a:r>
               <a:rPr lang="en-US" sz="2000" dirty="0" smtClean="0"/>
-              <a:t>:</a:t>
-            </a:r>
-            <a:r>
-              <a:rPr lang="en-US" sz="2000" dirty="0" smtClean="0"/>
-              <a:t>Provide </a:t>
+              <a:t>:Provide </a:t>
             </a:r>
             <a:r>
               <a:rPr lang="en-US" sz="2000" dirty="0"/>
@@ -3946,35 +4795,11 @@
             </a:r>
             <a:r>
               <a:rPr lang="en-US" sz="2000" b="1" dirty="0" smtClean="0"/>
-              <a:t>            </a:t>
-            </a:r>
-            <a:r>
-              <a:rPr lang="en-US" sz="2000" b="1" dirty="0" smtClean="0"/>
-              <a:t>    </a:t>
+              <a:t>                </a:t>
             </a:r>
             <a:r>
               <a:rPr lang="en-US" sz="2000" dirty="0" smtClean="0"/>
-              <a:t>:</a:t>
-            </a:r>
-            <a:r>
-              <a:rPr lang="en-US" sz="2000" dirty="0" smtClean="0"/>
-              <a:t>Create a strong password in the "Password" field. The password should be at </a:t>
-            </a:r>
-            <a:r>
-              <a:rPr lang="en-US" sz="2000" dirty="0" smtClean="0"/>
-              <a:t>least </a:t>
-            </a:r>
-            <a:r>
-              <a:rPr lang="en-US" sz="2000" dirty="0" smtClean="0"/>
-              <a:t>8 characters long and include a mix of letters, numbers, and special 		                   </a:t>
-            </a:r>
-            <a:r>
-              <a:rPr lang="en-US" sz="2000" dirty="0" smtClean="0"/>
-              <a:t> characters</a:t>
-            </a:r>
-            <a:r>
-              <a:rPr lang="en-US" sz="2000" dirty="0" smtClean="0"/>
-              <a:t>.</a:t>
+              <a:t>:Create a strong password in the "Password" field. The password should be at least 8 characters long and include a mix of letters, numbers, and special 		                    characters.</a:t>
             </a:r>
             <a:endParaRPr lang="en-US" sz="2000" dirty="0"/>
           </a:p>
@@ -4052,11 +4877,7 @@
             </a:r>
             <a:r>
               <a:rPr lang="en-US" sz="2000" dirty="0" smtClean="0"/>
-              <a:t>the </a:t>
-            </a:r>
-            <a:r>
-              <a:rPr lang="en-US" sz="2000" dirty="0" smtClean="0"/>
-              <a:t>form </a:t>
+              <a:t>the form </a:t>
             </a:r>
             <a:r>
               <a:rPr lang="en-US" sz="2000" dirty="0"/>
@@ -4843,11 +5664,7 @@
             <a:pPr algn="l"/>
             <a:r>
               <a:rPr lang="en-US" sz="4000" b="1" dirty="0" smtClean="0"/>
-              <a:t>   1.3 Sign </a:t>
-            </a:r>
-            <a:r>
-              <a:rPr lang="en-US" sz="4000" b="1" dirty="0" smtClean="0"/>
-              <a:t>In</a:t>
+              <a:t>   1.3 Sign In</a:t>
             </a:r>
             <a:endParaRPr lang="en-US" sz="4000" b="1" dirty="0"/>
           </a:p>
@@ -4893,7 +5710,6 @@
               <a:rPr lang="en-US" sz="2000" dirty="0"/>
               <a:t>, entering your email and password credentials, and clicking the 'Sign In' button</a:t>
             </a:r>
-            <a:endParaRPr lang="en-US" sz="2000" dirty="0"/>
           </a:p>
         </p:txBody>
       </p:sp>
@@ -5043,11 +5859,7 @@
             <a:pPr algn="l"/>
             <a:r>
               <a:rPr lang="en-US" sz="4000" b="1" dirty="0" smtClean="0"/>
-              <a:t>   1.4 First Time Loggin</a:t>
-            </a:r>
-            <a:r>
-              <a:rPr lang="en-US" sz="4000" b="1" dirty="0" smtClean="0"/>
-              <a:t>g In</a:t>
+              <a:t>   1.4 First Time Logging In</a:t>
             </a:r>
             <a:endParaRPr lang="en-US" sz="4000" b="1" dirty="0"/>
           </a:p>

</xml_diff>